<commit_message>
add num obs to stacked bar
</commit_message>
<xml_diff>
--- a/output/intermediate-files/UpsetPlot/UpsetPlot_figs.pptx
+++ b/output/intermediate-files/UpsetPlot/UpsetPlot_figs.pptx
@@ -12,6 +12,7 @@
     <p:sldId id="264" r:id="rId6"/>
     <p:sldId id="261" r:id="rId7"/>
     <p:sldId id="262" r:id="rId8"/>
+    <p:sldId id="265" r:id="rId9"/>
   </p:sldIdLst>
   <p:sldSz cx="6858000" cy="6858000"/>
   <p:notesSz cx="6858000" cy="9144000"/>
@@ -2086,7 +2087,7 @@
           <a:p>
             <a:fld id="{6C50C29A-2F47-3D4C-AB69-341415D0A2AD}" type="datetimeFigureOut">
               <a:rPr lang="en-US" smtClean="0"/>
-              <a:t>7/3/20</a:t>
+              <a:t>8/30/20</a:t>
             </a:fld>
             <a:endParaRPr lang="en-US"/>
           </a:p>
@@ -2256,7 +2257,7 @@
           <a:p>
             <a:fld id="{6C50C29A-2F47-3D4C-AB69-341415D0A2AD}" type="datetimeFigureOut">
               <a:rPr lang="en-US" smtClean="0"/>
-              <a:t>7/3/20</a:t>
+              <a:t>8/30/20</a:t>
             </a:fld>
             <a:endParaRPr lang="en-US"/>
           </a:p>
@@ -2436,7 +2437,7 @@
           <a:p>
             <a:fld id="{6C50C29A-2F47-3D4C-AB69-341415D0A2AD}" type="datetimeFigureOut">
               <a:rPr lang="en-US" smtClean="0"/>
-              <a:t>7/3/20</a:t>
+              <a:t>8/30/20</a:t>
             </a:fld>
             <a:endParaRPr lang="en-US"/>
           </a:p>
@@ -2606,7 +2607,7 @@
           <a:p>
             <a:fld id="{6C50C29A-2F47-3D4C-AB69-341415D0A2AD}" type="datetimeFigureOut">
               <a:rPr lang="en-US" smtClean="0"/>
-              <a:t>7/3/20</a:t>
+              <a:t>8/30/20</a:t>
             </a:fld>
             <a:endParaRPr lang="en-US"/>
           </a:p>
@@ -2850,7 +2851,7 @@
           <a:p>
             <a:fld id="{6C50C29A-2F47-3D4C-AB69-341415D0A2AD}" type="datetimeFigureOut">
               <a:rPr lang="en-US" smtClean="0"/>
-              <a:t>7/3/20</a:t>
+              <a:t>8/30/20</a:t>
             </a:fld>
             <a:endParaRPr lang="en-US"/>
           </a:p>
@@ -3082,7 +3083,7 @@
           <a:p>
             <a:fld id="{6C50C29A-2F47-3D4C-AB69-341415D0A2AD}" type="datetimeFigureOut">
               <a:rPr lang="en-US" smtClean="0"/>
-              <a:t>7/3/20</a:t>
+              <a:t>8/30/20</a:t>
             </a:fld>
             <a:endParaRPr lang="en-US"/>
           </a:p>
@@ -3449,7 +3450,7 @@
           <a:p>
             <a:fld id="{6C50C29A-2F47-3D4C-AB69-341415D0A2AD}" type="datetimeFigureOut">
               <a:rPr lang="en-US" smtClean="0"/>
-              <a:t>7/3/20</a:t>
+              <a:t>8/30/20</a:t>
             </a:fld>
             <a:endParaRPr lang="en-US"/>
           </a:p>
@@ -3567,7 +3568,7 @@
           <a:p>
             <a:fld id="{6C50C29A-2F47-3D4C-AB69-341415D0A2AD}" type="datetimeFigureOut">
               <a:rPr lang="en-US" smtClean="0"/>
-              <a:t>7/3/20</a:t>
+              <a:t>8/30/20</a:t>
             </a:fld>
             <a:endParaRPr lang="en-US"/>
           </a:p>
@@ -3662,7 +3663,7 @@
           <a:p>
             <a:fld id="{6C50C29A-2F47-3D4C-AB69-341415D0A2AD}" type="datetimeFigureOut">
               <a:rPr lang="en-US" smtClean="0"/>
-              <a:t>7/3/20</a:t>
+              <a:t>8/30/20</a:t>
             </a:fld>
             <a:endParaRPr lang="en-US"/>
           </a:p>
@@ -3939,7 +3940,7 @@
           <a:p>
             <a:fld id="{6C50C29A-2F47-3D4C-AB69-341415D0A2AD}" type="datetimeFigureOut">
               <a:rPr lang="en-US" smtClean="0"/>
-              <a:t>7/3/20</a:t>
+              <a:t>8/30/20</a:t>
             </a:fld>
             <a:endParaRPr lang="en-US"/>
           </a:p>
@@ -4196,7 +4197,7 @@
           <a:p>
             <a:fld id="{6C50C29A-2F47-3D4C-AB69-341415D0A2AD}" type="datetimeFigureOut">
               <a:rPr lang="en-US" smtClean="0"/>
-              <a:t>7/3/20</a:t>
+              <a:t>8/30/20</a:t>
             </a:fld>
             <a:endParaRPr lang="en-US"/>
           </a:p>
@@ -4409,7 +4410,7 @@
           <a:p>
             <a:fld id="{6C50C29A-2F47-3D4C-AB69-341415D0A2AD}" type="datetimeFigureOut">
               <a:rPr lang="en-US" smtClean="0"/>
-              <a:t>7/3/20</a:t>
+              <a:t>8/30/20</a:t>
             </a:fld>
             <a:endParaRPr lang="en-US"/>
           </a:p>
@@ -19065,6 +19066,332 @@
 </p:sld>
 </file>
 
+<file path=ppt/slides/slide8.xml><?xml version="1.0" encoding="utf-8"?>
+<p:sld xmlns:a="http://schemas.openxmlformats.org/drawingml/2006/main" xmlns:r="http://schemas.openxmlformats.org/officeDocument/2006/relationships" xmlns:p="http://schemas.openxmlformats.org/presentationml/2006/main">
+  <p:cSld>
+    <p:spTree>
+      <p:nvGrpSpPr>
+        <p:cNvPr id="1" name=""/>
+        <p:cNvGrpSpPr/>
+        <p:nvPr/>
+      </p:nvGrpSpPr>
+      <p:grpSpPr>
+        <a:xfrm>
+          <a:off x="0" y="0"/>
+          <a:ext cx="0" cy="0"/>
+          <a:chOff x="0" y="0"/>
+          <a:chExt cx="0" cy="0"/>
+        </a:xfrm>
+      </p:grpSpPr>
+      <p:pic>
+        <p:nvPicPr>
+          <p:cNvPr id="5" name="Picture 4" descr="A close up of a building&#10;&#10;Description automatically generated">
+            <a:extLst>
+              <a:ext uri="{FF2B5EF4-FFF2-40B4-BE49-F238E27FC236}">
+                <a16:creationId xmlns:a16="http://schemas.microsoft.com/office/drawing/2014/main" id="{7E8E31CB-0A55-8447-BF8D-EAC91D2138D7}"/>
+              </a:ext>
+            </a:extLst>
+          </p:cNvPr>
+          <p:cNvPicPr>
+            <a:picLocks noChangeAspect="1"/>
+          </p:cNvPicPr>
+          <p:nvPr/>
+        </p:nvPicPr>
+        <p:blipFill>
+          <a:blip r:embed="rId2"/>
+          <a:stretch>
+            <a:fillRect/>
+          </a:stretch>
+        </p:blipFill>
+        <p:spPr>
+          <a:xfrm>
+            <a:off x="0" y="0"/>
+            <a:ext cx="6858000" cy="6858000"/>
+          </a:xfrm>
+          <a:prstGeom prst="rect">
+            <a:avLst/>
+          </a:prstGeom>
+        </p:spPr>
+      </p:pic>
+      <p:sp>
+        <p:nvSpPr>
+          <p:cNvPr id="6" name="TextBox 5">
+            <a:extLst>
+              <a:ext uri="{FF2B5EF4-FFF2-40B4-BE49-F238E27FC236}">
+                <a16:creationId xmlns:a16="http://schemas.microsoft.com/office/drawing/2014/main" id="{2A994635-52A6-7F4C-A42B-CC842D009911}"/>
+              </a:ext>
+            </a:extLst>
+          </p:cNvPr>
+          <p:cNvSpPr txBox="1"/>
+          <p:nvPr/>
+        </p:nvSpPr>
+        <p:spPr>
+          <a:xfrm>
+            <a:off x="631832" y="125334"/>
+            <a:ext cx="625492" cy="200055"/>
+          </a:xfrm>
+          <a:prstGeom prst="rect">
+            <a:avLst/>
+          </a:prstGeom>
+          <a:noFill/>
+        </p:spPr>
+        <p:txBody>
+          <a:bodyPr wrap="none" rtlCol="0">
+            <a:spAutoFit/>
+          </a:bodyPr>
+          <a:lstStyle/>
+          <a:p>
+            <a:r>
+              <a:rPr lang="en-US" sz="700" dirty="0">
+                <a:latin typeface="Arial" panose="020B0604020202020204" pitchFamily="34" charset="0"/>
+                <a:cs typeface="Arial" panose="020B0604020202020204" pitchFamily="34" charset="0"/>
+              </a:rPr>
+              <a:t>N=115,072</a:t>
+            </a:r>
+          </a:p>
+        </p:txBody>
+      </p:sp>
+      <p:sp>
+        <p:nvSpPr>
+          <p:cNvPr id="7" name="TextBox 6">
+            <a:extLst>
+              <a:ext uri="{FF2B5EF4-FFF2-40B4-BE49-F238E27FC236}">
+                <a16:creationId xmlns:a16="http://schemas.microsoft.com/office/drawing/2014/main" id="{31D2F2EF-F756-3B4B-A5E9-8680E5D27E57}"/>
+              </a:ext>
+            </a:extLst>
+          </p:cNvPr>
+          <p:cNvSpPr txBox="1"/>
+          <p:nvPr/>
+        </p:nvSpPr>
+        <p:spPr>
+          <a:xfrm>
+            <a:off x="1263664" y="125333"/>
+            <a:ext cx="625492" cy="200055"/>
+          </a:xfrm>
+          <a:prstGeom prst="rect">
+            <a:avLst/>
+          </a:prstGeom>
+          <a:noFill/>
+        </p:spPr>
+        <p:txBody>
+          <a:bodyPr wrap="none" rtlCol="0">
+            <a:spAutoFit/>
+          </a:bodyPr>
+          <a:lstStyle/>
+          <a:p>
+            <a:r>
+              <a:rPr lang="en-US" sz="700" dirty="0">
+                <a:latin typeface="Arial" panose="020B0604020202020204" pitchFamily="34" charset="0"/>
+                <a:cs typeface="Arial" panose="020B0604020202020204" pitchFamily="34" charset="0"/>
+              </a:rPr>
+              <a:t>N=282,608</a:t>
+            </a:r>
+          </a:p>
+        </p:txBody>
+      </p:sp>
+      <p:sp>
+        <p:nvSpPr>
+          <p:cNvPr id="8" name="TextBox 7">
+            <a:extLst>
+              <a:ext uri="{FF2B5EF4-FFF2-40B4-BE49-F238E27FC236}">
+                <a16:creationId xmlns:a16="http://schemas.microsoft.com/office/drawing/2014/main" id="{4C611D7B-AE45-7E4C-8AD7-4E951C2FDF83}"/>
+              </a:ext>
+            </a:extLst>
+          </p:cNvPr>
+          <p:cNvSpPr txBox="1"/>
+          <p:nvPr/>
+        </p:nvSpPr>
+        <p:spPr>
+          <a:xfrm>
+            <a:off x="1917508" y="131744"/>
+            <a:ext cx="700833" cy="200055"/>
+          </a:xfrm>
+          <a:prstGeom prst="rect">
+            <a:avLst/>
+          </a:prstGeom>
+          <a:noFill/>
+        </p:spPr>
+        <p:txBody>
+          <a:bodyPr wrap="none" rtlCol="0">
+            <a:spAutoFit/>
+          </a:bodyPr>
+          <a:lstStyle/>
+          <a:p>
+            <a:r>
+              <a:rPr lang="en-US" sz="700" dirty="0">
+                <a:latin typeface="Arial" panose="020B0604020202020204" pitchFamily="34" charset="0"/>
+                <a:cs typeface="Arial" panose="020B0604020202020204" pitchFamily="34" charset="0"/>
+              </a:rPr>
+              <a:t>N=5,673,483</a:t>
+            </a:r>
+          </a:p>
+        </p:txBody>
+      </p:sp>
+      <p:sp>
+        <p:nvSpPr>
+          <p:cNvPr id="9" name="TextBox 8">
+            <a:extLst>
+              <a:ext uri="{FF2B5EF4-FFF2-40B4-BE49-F238E27FC236}">
+                <a16:creationId xmlns:a16="http://schemas.microsoft.com/office/drawing/2014/main" id="{900B0F0A-2A01-764F-9248-F13A9B03FEFA}"/>
+              </a:ext>
+            </a:extLst>
+          </p:cNvPr>
+          <p:cNvSpPr txBox="1"/>
+          <p:nvPr/>
+        </p:nvSpPr>
+        <p:spPr>
+          <a:xfrm>
+            <a:off x="2646693" y="125333"/>
+            <a:ext cx="575799" cy="200055"/>
+          </a:xfrm>
+          <a:prstGeom prst="rect">
+            <a:avLst/>
+          </a:prstGeom>
+          <a:noFill/>
+        </p:spPr>
+        <p:txBody>
+          <a:bodyPr wrap="none" rtlCol="0">
+            <a:spAutoFit/>
+          </a:bodyPr>
+          <a:lstStyle/>
+          <a:p>
+            <a:r>
+              <a:rPr lang="en-US" sz="700" dirty="0">
+                <a:latin typeface="Arial" panose="020B0604020202020204" pitchFamily="34" charset="0"/>
+                <a:cs typeface="Arial" panose="020B0604020202020204" pitchFamily="34" charset="0"/>
+              </a:rPr>
+              <a:t>N=37,659</a:t>
+            </a:r>
+          </a:p>
+        </p:txBody>
+      </p:sp>
+      <p:sp>
+        <p:nvSpPr>
+          <p:cNvPr id="10" name="TextBox 9">
+            <a:extLst>
+              <a:ext uri="{FF2B5EF4-FFF2-40B4-BE49-F238E27FC236}">
+                <a16:creationId xmlns:a16="http://schemas.microsoft.com/office/drawing/2014/main" id="{4D53CA98-93EB-0548-815A-6114E4EA647A}"/>
+              </a:ext>
+            </a:extLst>
+          </p:cNvPr>
+          <p:cNvSpPr txBox="1"/>
+          <p:nvPr/>
+        </p:nvSpPr>
+        <p:spPr>
+          <a:xfrm>
+            <a:off x="3201228" y="125332"/>
+            <a:ext cx="750526" cy="200055"/>
+          </a:xfrm>
+          <a:prstGeom prst="rect">
+            <a:avLst/>
+          </a:prstGeom>
+          <a:noFill/>
+        </p:spPr>
+        <p:txBody>
+          <a:bodyPr wrap="none" rtlCol="0">
+            <a:spAutoFit/>
+          </a:bodyPr>
+          <a:lstStyle/>
+          <a:p>
+            <a:r>
+              <a:rPr lang="en-US" sz="700" dirty="0">
+                <a:latin typeface="Arial" panose="020B0604020202020204" pitchFamily="34" charset="0"/>
+                <a:cs typeface="Arial" panose="020B0604020202020204" pitchFamily="34" charset="0"/>
+              </a:rPr>
+              <a:t>N=10,190,116</a:t>
+            </a:r>
+          </a:p>
+        </p:txBody>
+      </p:sp>
+      <p:sp>
+        <p:nvSpPr>
+          <p:cNvPr id="11" name="TextBox 10">
+            <a:extLst>
+              <a:ext uri="{FF2B5EF4-FFF2-40B4-BE49-F238E27FC236}">
+                <a16:creationId xmlns:a16="http://schemas.microsoft.com/office/drawing/2014/main" id="{99E8854C-3551-2B40-80EE-3ACF33FC5FE3}"/>
+              </a:ext>
+            </a:extLst>
+          </p:cNvPr>
+          <p:cNvSpPr txBox="1"/>
+          <p:nvPr/>
+        </p:nvSpPr>
+        <p:spPr>
+          <a:xfrm>
+            <a:off x="3894235" y="131744"/>
+            <a:ext cx="700833" cy="200055"/>
+          </a:xfrm>
+          <a:prstGeom prst="rect">
+            <a:avLst/>
+          </a:prstGeom>
+          <a:noFill/>
+        </p:spPr>
+        <p:txBody>
+          <a:bodyPr wrap="none" rtlCol="0">
+            <a:spAutoFit/>
+          </a:bodyPr>
+          <a:lstStyle/>
+          <a:p>
+            <a:r>
+              <a:rPr lang="en-US" sz="700" dirty="0">
+                <a:latin typeface="Arial" panose="020B0604020202020204" pitchFamily="34" charset="0"/>
+                <a:cs typeface="Arial" panose="020B0604020202020204" pitchFamily="34" charset="0"/>
+              </a:rPr>
+              <a:t>N=3,711,951</a:t>
+            </a:r>
+          </a:p>
+        </p:txBody>
+      </p:sp>
+      <p:sp>
+        <p:nvSpPr>
+          <p:cNvPr id="12" name="TextBox 11">
+            <a:extLst>
+              <a:ext uri="{FF2B5EF4-FFF2-40B4-BE49-F238E27FC236}">
+                <a16:creationId xmlns:a16="http://schemas.microsoft.com/office/drawing/2014/main" id="{ECD109EE-0FFB-C646-9202-E82DFC2A185C}"/>
+              </a:ext>
+            </a:extLst>
+          </p:cNvPr>
+          <p:cNvSpPr txBox="1"/>
+          <p:nvPr/>
+        </p:nvSpPr>
+        <p:spPr>
+          <a:xfrm>
+            <a:off x="4556460" y="138156"/>
+            <a:ext cx="700833" cy="200055"/>
+          </a:xfrm>
+          <a:prstGeom prst="rect">
+            <a:avLst/>
+          </a:prstGeom>
+          <a:noFill/>
+        </p:spPr>
+        <p:txBody>
+          <a:bodyPr wrap="none" rtlCol="0">
+            <a:spAutoFit/>
+          </a:bodyPr>
+          <a:lstStyle/>
+          <a:p>
+            <a:r>
+              <a:rPr lang="en-US" sz="700" dirty="0">
+                <a:latin typeface="Arial" panose="020B0604020202020204" pitchFamily="34" charset="0"/>
+                <a:cs typeface="Arial" panose="020B0604020202020204" pitchFamily="34" charset="0"/>
+              </a:rPr>
+              <a:t>N=8,477,058</a:t>
+            </a:r>
+          </a:p>
+        </p:txBody>
+      </p:sp>
+    </p:spTree>
+    <p:extLst>
+      <p:ext uri="{BB962C8B-B14F-4D97-AF65-F5344CB8AC3E}">
+        <p14:creationId xmlns:p14="http://schemas.microsoft.com/office/powerpoint/2010/main" val="3836824468"/>
+      </p:ext>
+    </p:extLst>
+  </p:cSld>
+  <p:clrMapOvr>
+    <a:masterClrMapping/>
+  </p:clrMapOvr>
+</p:sld>
+</file>
+
 <file path=ppt/theme/theme1.xml><?xml version="1.0" encoding="utf-8"?>
 <a:theme xmlns:a="http://schemas.openxmlformats.org/drawingml/2006/main" name="Office Theme">
   <a:themeElements>

</xml_diff>